<commit_message>
Updated documentation and some comments.
</commit_message>
<xml_diff>
--- a/Documentation/Technical Documentation.pptx
+++ b/Documentation/Technical Documentation.pptx
@@ -105,6 +105,11 @@
       </a:defRPr>
     </a:lvl9pPr>
   </p:defaultTextStyle>
+  <p:extLst>
+    <p:ext uri="{EFAFB233-063F-42B5-8137-9DF3F51BA10A}">
+      <p15:sldGuideLst xmlns:p15="http://schemas.microsoft.com/office/powerpoint/2012/main"/>
+    </p:ext>
+  </p:extLst>
 </p:presentation>
 </file>
 
@@ -3324,10 +3329,10 @@
       </p:grpSpPr>
       <p:sp>
         <p:nvSpPr>
-          <p:cNvPr id="9" name="Rektangel: afrundede hjørner 8">
-            <a:extLst>
-              <a:ext uri="{FF2B5EF4-FFF2-40B4-BE49-F238E27FC236}">
-                <a16:creationId xmlns:a16="http://schemas.microsoft.com/office/drawing/2014/main" id="{F988DCD2-8B6F-D406-9C00-A3159E1AC662}"/>
+          <p:cNvPr id="71" name="Rektangel: afrundede hjørner 70">
+            <a:extLst>
+              <a:ext uri="{FF2B5EF4-FFF2-40B4-BE49-F238E27FC236}">
+                <a16:creationId xmlns:a16="http://schemas.microsoft.com/office/drawing/2014/main" id="{C93DE9C1-3850-EB1A-DD87-2FA0D5E2ADDF}"/>
               </a:ext>
             </a:extLst>
           </p:cNvPr>
@@ -3336,8 +3341,436 @@
         </p:nvSpPr>
         <p:spPr>
           <a:xfrm>
-            <a:off x="562708" y="2192215"/>
-            <a:ext cx="2397369" cy="890954"/>
+            <a:off x="6748477" y="1838076"/>
+            <a:ext cx="5315252" cy="1144076"/>
+          </a:xfrm>
+          <a:custGeom>
+            <a:avLst/>
+            <a:gdLst>
+              <a:gd name="connsiteX0" fmla="*/ 0 w 5315252"/>
+              <a:gd name="connsiteY0" fmla="*/ 79468 h 1144076"/>
+              <a:gd name="connsiteX1" fmla="*/ 79468 w 5315252"/>
+              <a:gd name="connsiteY1" fmla="*/ 0 h 1144076"/>
+              <a:gd name="connsiteX2" fmla="*/ 620881 w 5315252"/>
+              <a:gd name="connsiteY2" fmla="*/ 0 h 1144076"/>
+              <a:gd name="connsiteX3" fmla="*/ 1316984 w 5315252"/>
+              <a:gd name="connsiteY3" fmla="*/ 0 h 1144076"/>
+              <a:gd name="connsiteX4" fmla="*/ 1806834 w 5315252"/>
+              <a:gd name="connsiteY4" fmla="*/ 0 h 1144076"/>
+              <a:gd name="connsiteX5" fmla="*/ 2399810 w 5315252"/>
+              <a:gd name="connsiteY5" fmla="*/ 0 h 1144076"/>
+              <a:gd name="connsiteX6" fmla="*/ 3044350 w 5315252"/>
+              <a:gd name="connsiteY6" fmla="*/ 0 h 1144076"/>
+              <a:gd name="connsiteX7" fmla="*/ 3740452 w 5315252"/>
+              <a:gd name="connsiteY7" fmla="*/ 0 h 1144076"/>
+              <a:gd name="connsiteX8" fmla="*/ 4281866 w 5315252"/>
+              <a:gd name="connsiteY8" fmla="*/ 0 h 1144076"/>
+              <a:gd name="connsiteX9" fmla="*/ 5235784 w 5315252"/>
+              <a:gd name="connsiteY9" fmla="*/ 0 h 1144076"/>
+              <a:gd name="connsiteX10" fmla="*/ 5315252 w 5315252"/>
+              <a:gd name="connsiteY10" fmla="*/ 79468 h 1144076"/>
+              <a:gd name="connsiteX11" fmla="*/ 5315252 w 5315252"/>
+              <a:gd name="connsiteY11" fmla="*/ 591741 h 1144076"/>
+              <a:gd name="connsiteX12" fmla="*/ 5315252 w 5315252"/>
+              <a:gd name="connsiteY12" fmla="*/ 1064608 h 1144076"/>
+              <a:gd name="connsiteX13" fmla="*/ 5235784 w 5315252"/>
+              <a:gd name="connsiteY13" fmla="*/ 1144076 h 1144076"/>
+              <a:gd name="connsiteX14" fmla="*/ 4539681 w 5315252"/>
+              <a:gd name="connsiteY14" fmla="*/ 1144076 h 1144076"/>
+              <a:gd name="connsiteX15" fmla="*/ 4049831 w 5315252"/>
+              <a:gd name="connsiteY15" fmla="*/ 1144076 h 1144076"/>
+              <a:gd name="connsiteX16" fmla="*/ 3302166 w 5315252"/>
+              <a:gd name="connsiteY16" fmla="*/ 1144076 h 1144076"/>
+              <a:gd name="connsiteX17" fmla="*/ 2657626 w 5315252"/>
+              <a:gd name="connsiteY17" fmla="*/ 1144076 h 1144076"/>
+              <a:gd name="connsiteX18" fmla="*/ 1909960 w 5315252"/>
+              <a:gd name="connsiteY18" fmla="*/ 1144076 h 1144076"/>
+              <a:gd name="connsiteX19" fmla="*/ 1368547 w 5315252"/>
+              <a:gd name="connsiteY19" fmla="*/ 1144076 h 1144076"/>
+              <a:gd name="connsiteX20" fmla="*/ 79468 w 5315252"/>
+              <a:gd name="connsiteY20" fmla="*/ 1144076 h 1144076"/>
+              <a:gd name="connsiteX21" fmla="*/ 0 w 5315252"/>
+              <a:gd name="connsiteY21" fmla="*/ 1064608 h 1144076"/>
+              <a:gd name="connsiteX22" fmla="*/ 0 w 5315252"/>
+              <a:gd name="connsiteY22" fmla="*/ 572038 h 1144076"/>
+              <a:gd name="connsiteX23" fmla="*/ 0 w 5315252"/>
+              <a:gd name="connsiteY23" fmla="*/ 79468 h 1144076"/>
+            </a:gdLst>
+            <a:ahLst/>
+            <a:cxnLst>
+              <a:cxn ang="0">
+                <a:pos x="connsiteX0" y="connsiteY0"/>
+              </a:cxn>
+              <a:cxn ang="0">
+                <a:pos x="connsiteX1" y="connsiteY1"/>
+              </a:cxn>
+              <a:cxn ang="0">
+                <a:pos x="connsiteX2" y="connsiteY2"/>
+              </a:cxn>
+              <a:cxn ang="0">
+                <a:pos x="connsiteX3" y="connsiteY3"/>
+              </a:cxn>
+              <a:cxn ang="0">
+                <a:pos x="connsiteX4" y="connsiteY4"/>
+              </a:cxn>
+              <a:cxn ang="0">
+                <a:pos x="connsiteX5" y="connsiteY5"/>
+              </a:cxn>
+              <a:cxn ang="0">
+                <a:pos x="connsiteX6" y="connsiteY6"/>
+              </a:cxn>
+              <a:cxn ang="0">
+                <a:pos x="connsiteX7" y="connsiteY7"/>
+              </a:cxn>
+              <a:cxn ang="0">
+                <a:pos x="connsiteX8" y="connsiteY8"/>
+              </a:cxn>
+              <a:cxn ang="0">
+                <a:pos x="connsiteX9" y="connsiteY9"/>
+              </a:cxn>
+              <a:cxn ang="0">
+                <a:pos x="connsiteX10" y="connsiteY10"/>
+              </a:cxn>
+              <a:cxn ang="0">
+                <a:pos x="connsiteX11" y="connsiteY11"/>
+              </a:cxn>
+              <a:cxn ang="0">
+                <a:pos x="connsiteX12" y="connsiteY12"/>
+              </a:cxn>
+              <a:cxn ang="0">
+                <a:pos x="connsiteX13" y="connsiteY13"/>
+              </a:cxn>
+              <a:cxn ang="0">
+                <a:pos x="connsiteX14" y="connsiteY14"/>
+              </a:cxn>
+              <a:cxn ang="0">
+                <a:pos x="connsiteX15" y="connsiteY15"/>
+              </a:cxn>
+              <a:cxn ang="0">
+                <a:pos x="connsiteX16" y="connsiteY16"/>
+              </a:cxn>
+              <a:cxn ang="0">
+                <a:pos x="connsiteX17" y="connsiteY17"/>
+              </a:cxn>
+              <a:cxn ang="0">
+                <a:pos x="connsiteX18" y="connsiteY18"/>
+              </a:cxn>
+              <a:cxn ang="0">
+                <a:pos x="connsiteX19" y="connsiteY19"/>
+              </a:cxn>
+              <a:cxn ang="0">
+                <a:pos x="connsiteX20" y="connsiteY20"/>
+              </a:cxn>
+              <a:cxn ang="0">
+                <a:pos x="connsiteX21" y="connsiteY21"/>
+              </a:cxn>
+              <a:cxn ang="0">
+                <a:pos x="connsiteX22" y="connsiteY22"/>
+              </a:cxn>
+              <a:cxn ang="0">
+                <a:pos x="connsiteX23" y="connsiteY23"/>
+              </a:cxn>
+            </a:cxnLst>
+            <a:rect l="l" t="t" r="r" b="b"/>
+            <a:pathLst>
+              <a:path w="5315252" h="1144076" fill="none" extrusionOk="0">
+                <a:moveTo>
+                  <a:pt x="0" y="79468"/>
+                </a:moveTo>
+                <a:cubicBezTo>
+                  <a:pt x="1447" y="34775"/>
+                  <a:pt x="35387" y="-4100"/>
+                  <a:pt x="79468" y="0"/>
+                </a:cubicBezTo>
+                <a:cubicBezTo>
+                  <a:pt x="201379" y="3523"/>
+                  <a:pt x="467691" y="10532"/>
+                  <a:pt x="620881" y="0"/>
+                </a:cubicBezTo>
+                <a:cubicBezTo>
+                  <a:pt x="774071" y="-10532"/>
+                  <a:pt x="1151042" y="-20220"/>
+                  <a:pt x="1316984" y="0"/>
+                </a:cubicBezTo>
+                <a:cubicBezTo>
+                  <a:pt x="1482926" y="20220"/>
+                  <a:pt x="1567327" y="-13989"/>
+                  <a:pt x="1806834" y="0"/>
+                </a:cubicBezTo>
+                <a:cubicBezTo>
+                  <a:pt x="2046341" y="13989"/>
+                  <a:pt x="2222932" y="-3471"/>
+                  <a:pt x="2399810" y="0"/>
+                </a:cubicBezTo>
+                <a:cubicBezTo>
+                  <a:pt x="2576688" y="3471"/>
+                  <a:pt x="2876640" y="3756"/>
+                  <a:pt x="3044350" y="0"/>
+                </a:cubicBezTo>
+                <a:cubicBezTo>
+                  <a:pt x="3212060" y="-3756"/>
+                  <a:pt x="3566553" y="-26992"/>
+                  <a:pt x="3740452" y="0"/>
+                </a:cubicBezTo>
+                <a:cubicBezTo>
+                  <a:pt x="3914351" y="26992"/>
+                  <a:pt x="4027791" y="22499"/>
+                  <a:pt x="4281866" y="0"/>
+                </a:cubicBezTo>
+                <a:cubicBezTo>
+                  <a:pt x="4535941" y="-22499"/>
+                  <a:pt x="4775383" y="35895"/>
+                  <a:pt x="5235784" y="0"/>
+                </a:cubicBezTo>
+                <a:cubicBezTo>
+                  <a:pt x="5284327" y="1983"/>
+                  <a:pt x="5306194" y="31883"/>
+                  <a:pt x="5315252" y="79468"/>
+                </a:cubicBezTo>
+                <a:cubicBezTo>
+                  <a:pt x="5304040" y="197509"/>
+                  <a:pt x="5307705" y="340834"/>
+                  <a:pt x="5315252" y="591741"/>
+                </a:cubicBezTo>
+                <a:cubicBezTo>
+                  <a:pt x="5322799" y="842648"/>
+                  <a:pt x="5304171" y="869672"/>
+                  <a:pt x="5315252" y="1064608"/>
+                </a:cubicBezTo>
+                <a:cubicBezTo>
+                  <a:pt x="5321131" y="1106286"/>
+                  <a:pt x="5288191" y="1142831"/>
+                  <a:pt x="5235784" y="1144076"/>
+                </a:cubicBezTo>
+                <a:cubicBezTo>
+                  <a:pt x="5043935" y="1146038"/>
+                  <a:pt x="4840539" y="1118659"/>
+                  <a:pt x="4539681" y="1144076"/>
+                </a:cubicBezTo>
+                <a:cubicBezTo>
+                  <a:pt x="4238823" y="1169493"/>
+                  <a:pt x="4188651" y="1151626"/>
+                  <a:pt x="4049831" y="1144076"/>
+                </a:cubicBezTo>
+                <a:cubicBezTo>
+                  <a:pt x="3911011" y="1136527"/>
+                  <a:pt x="3604945" y="1155651"/>
+                  <a:pt x="3302166" y="1144076"/>
+                </a:cubicBezTo>
+                <a:cubicBezTo>
+                  <a:pt x="2999387" y="1132501"/>
+                  <a:pt x="2838639" y="1157951"/>
+                  <a:pt x="2657626" y="1144076"/>
+                </a:cubicBezTo>
+                <a:cubicBezTo>
+                  <a:pt x="2476613" y="1130201"/>
+                  <a:pt x="2247186" y="1140647"/>
+                  <a:pt x="1909960" y="1144076"/>
+                </a:cubicBezTo>
+                <a:cubicBezTo>
+                  <a:pt x="1572734" y="1147505"/>
+                  <a:pt x="1529305" y="1165107"/>
+                  <a:pt x="1368547" y="1144076"/>
+                </a:cubicBezTo>
+                <a:cubicBezTo>
+                  <a:pt x="1207789" y="1123045"/>
+                  <a:pt x="529817" y="1130084"/>
+                  <a:pt x="79468" y="1144076"/>
+                </a:cubicBezTo>
+                <a:cubicBezTo>
+                  <a:pt x="38358" y="1134891"/>
+                  <a:pt x="-3426" y="1103396"/>
+                  <a:pt x="0" y="1064608"/>
+                </a:cubicBezTo>
+                <a:cubicBezTo>
+                  <a:pt x="6248" y="820438"/>
+                  <a:pt x="-8714" y="686283"/>
+                  <a:pt x="0" y="572038"/>
+                </a:cubicBezTo>
+                <a:cubicBezTo>
+                  <a:pt x="8714" y="457793"/>
+                  <a:pt x="-1360" y="288527"/>
+                  <a:pt x="0" y="79468"/>
+                </a:cubicBezTo>
+                <a:close/>
+              </a:path>
+              <a:path w="5315252" h="1144076" stroke="0" extrusionOk="0">
+                <a:moveTo>
+                  <a:pt x="0" y="79468"/>
+                </a:moveTo>
+                <a:cubicBezTo>
+                  <a:pt x="3903" y="33972"/>
+                  <a:pt x="36137" y="876"/>
+                  <a:pt x="79468" y="0"/>
+                </a:cubicBezTo>
+                <a:cubicBezTo>
+                  <a:pt x="218384" y="5714"/>
+                  <a:pt x="577745" y="17928"/>
+                  <a:pt x="724008" y="0"/>
+                </a:cubicBezTo>
+                <a:cubicBezTo>
+                  <a:pt x="870271" y="-17928"/>
+                  <a:pt x="1194793" y="6902"/>
+                  <a:pt x="1316984" y="0"/>
+                </a:cubicBezTo>
+                <a:cubicBezTo>
+                  <a:pt x="1439175" y="-6902"/>
+                  <a:pt x="1811255" y="-37141"/>
+                  <a:pt x="2064650" y="0"/>
+                </a:cubicBezTo>
+                <a:cubicBezTo>
+                  <a:pt x="2318045" y="37141"/>
+                  <a:pt x="2429446" y="-2373"/>
+                  <a:pt x="2709189" y="0"/>
+                </a:cubicBezTo>
+                <a:cubicBezTo>
+                  <a:pt x="2988932" y="2373"/>
+                  <a:pt x="3025825" y="-5910"/>
+                  <a:pt x="3250602" y="0"/>
+                </a:cubicBezTo>
+                <a:cubicBezTo>
+                  <a:pt x="3475379" y="5910"/>
+                  <a:pt x="3806304" y="-2726"/>
+                  <a:pt x="3946705" y="0"/>
+                </a:cubicBezTo>
+                <a:cubicBezTo>
+                  <a:pt x="4087106" y="2726"/>
+                  <a:pt x="4953765" y="-40803"/>
+                  <a:pt x="5235784" y="0"/>
+                </a:cubicBezTo>
+                <a:cubicBezTo>
+                  <a:pt x="5288978" y="2538"/>
+                  <a:pt x="5322498" y="27778"/>
+                  <a:pt x="5315252" y="79468"/>
+                </a:cubicBezTo>
+                <a:cubicBezTo>
+                  <a:pt x="5338847" y="303955"/>
+                  <a:pt x="5310244" y="342288"/>
+                  <a:pt x="5315252" y="581889"/>
+                </a:cubicBezTo>
+                <a:cubicBezTo>
+                  <a:pt x="5320260" y="821490"/>
+                  <a:pt x="5310708" y="850989"/>
+                  <a:pt x="5315252" y="1064608"/>
+                </a:cubicBezTo>
+                <a:cubicBezTo>
+                  <a:pt x="5318641" y="1108326"/>
+                  <a:pt x="5281218" y="1143437"/>
+                  <a:pt x="5235784" y="1144076"/>
+                </a:cubicBezTo>
+                <a:cubicBezTo>
+                  <a:pt x="5109694" y="1166891"/>
+                  <a:pt x="4770774" y="1135290"/>
+                  <a:pt x="4642808" y="1144076"/>
+                </a:cubicBezTo>
+                <a:cubicBezTo>
+                  <a:pt x="4514842" y="1152862"/>
+                  <a:pt x="4193567" y="1149386"/>
+                  <a:pt x="3946705" y="1144076"/>
+                </a:cubicBezTo>
+                <a:cubicBezTo>
+                  <a:pt x="3699843" y="1138766"/>
+                  <a:pt x="3469780" y="1177826"/>
+                  <a:pt x="3199039" y="1144076"/>
+                </a:cubicBezTo>
+                <a:cubicBezTo>
+                  <a:pt x="2928298" y="1110326"/>
+                  <a:pt x="2676880" y="1112383"/>
+                  <a:pt x="2502937" y="1144076"/>
+                </a:cubicBezTo>
+                <a:cubicBezTo>
+                  <a:pt x="2328994" y="1175769"/>
+                  <a:pt x="2017510" y="1176507"/>
+                  <a:pt x="1755271" y="1144076"/>
+                </a:cubicBezTo>
+                <a:cubicBezTo>
+                  <a:pt x="1493032" y="1111645"/>
+                  <a:pt x="1257567" y="1150559"/>
+                  <a:pt x="1007605" y="1144076"/>
+                </a:cubicBezTo>
+                <a:cubicBezTo>
+                  <a:pt x="757643" y="1137593"/>
+                  <a:pt x="509190" y="1137137"/>
+                  <a:pt x="79468" y="1144076"/>
+                </a:cubicBezTo>
+                <a:cubicBezTo>
+                  <a:pt x="33990" y="1143585"/>
+                  <a:pt x="-3644" y="1100691"/>
+                  <a:pt x="0" y="1064608"/>
+                </a:cubicBezTo>
+                <a:cubicBezTo>
+                  <a:pt x="-7360" y="879527"/>
+                  <a:pt x="-16182" y="692549"/>
+                  <a:pt x="0" y="552335"/>
+                </a:cubicBezTo>
+                <a:cubicBezTo>
+                  <a:pt x="16182" y="412121"/>
+                  <a:pt x="-14280" y="283633"/>
+                  <a:pt x="0" y="79468"/>
+                </a:cubicBezTo>
+                <a:close/>
+              </a:path>
+            </a:pathLst>
+          </a:custGeom>
+          <a:ln w="28575">
+            <a:solidFill>
+              <a:srgbClr val="FFC000"/>
+            </a:solidFill>
+            <a:extLst>
+              <a:ext uri="{C807C97D-BFC1-408E-A445-0C87EB9F89A2}">
+                <ask:lineSketchStyleProps xmlns:ask="http://schemas.microsoft.com/office/drawing/2018/sketchyshapes" sd="1970142334">
+                  <a:prstGeom prst="roundRect">
+                    <a:avLst>
+                      <a:gd name="adj" fmla="val 6946"/>
+                    </a:avLst>
+                  </a:prstGeom>
+                  <ask:type>
+                    <ask:lineSketchFreehand/>
+                  </ask:type>
+                </ask:lineSketchStyleProps>
+              </a:ext>
+            </a:extLst>
+          </a:ln>
+        </p:spPr>
+        <p:style>
+          <a:lnRef idx="2">
+            <a:schemeClr val="accent2"/>
+          </a:lnRef>
+          <a:fillRef idx="1">
+            <a:schemeClr val="lt1"/>
+          </a:fillRef>
+          <a:effectRef idx="0">
+            <a:schemeClr val="accent2"/>
+          </a:effectRef>
+          <a:fontRef idx="minor">
+            <a:schemeClr val="dk1"/>
+          </a:fontRef>
+        </p:style>
+        <p:txBody>
+          <a:bodyPr rtlCol="0" anchor="ctr"/>
+          <a:lstStyle/>
+          <a:p>
+            <a:pPr algn="ctr"/>
+            <a:endParaRPr lang="da-DK"/>
+          </a:p>
+        </p:txBody>
+      </p:sp>
+      <p:sp>
+        <p:nvSpPr>
+          <p:cNvPr id="9" name="Rektangel: afrundede hjørner 8">
+            <a:extLst>
+              <a:ext uri="{FF2B5EF4-FFF2-40B4-BE49-F238E27FC236}">
+                <a16:creationId xmlns:a16="http://schemas.microsoft.com/office/drawing/2014/main" id="{F988DCD2-8B6F-D406-9C00-A3159E1AC662}"/>
+              </a:ext>
+            </a:extLst>
+          </p:cNvPr>
+          <p:cNvSpPr/>
+          <p:nvPr/>
+        </p:nvSpPr>
+        <p:spPr>
+          <a:xfrm>
+            <a:off x="218677" y="2008786"/>
+            <a:ext cx="2171006" cy="806829"/>
           </a:xfrm>
           <a:prstGeom prst="roundRect">
             <a:avLst/>
@@ -3431,8 +3864,8 @@
         </p:nvSpPr>
         <p:spPr>
           <a:xfrm>
-            <a:off x="4897315" y="2192215"/>
-            <a:ext cx="2397369" cy="890954"/>
+            <a:off x="3548126" y="2026135"/>
+            <a:ext cx="2089173" cy="776417"/>
           </a:xfrm>
           <a:prstGeom prst="roundRect">
             <a:avLst/>
@@ -3480,8 +3913,8 @@
         </p:nvSpPr>
         <p:spPr>
           <a:xfrm>
-            <a:off x="9231923" y="2192215"/>
-            <a:ext cx="2397369" cy="890954"/>
+            <a:off x="9755052" y="2008786"/>
+            <a:ext cx="2120896" cy="788206"/>
           </a:xfrm>
           <a:prstGeom prst="roundRect">
             <a:avLst/>
@@ -3525,6 +3958,7 @@
             </a:extLst>
           </p:cNvPr>
           <p:cNvCxnSpPr>
+            <a:cxnSpLocks/>
             <a:stCxn id="9" idx="3"/>
             <a:endCxn id="11" idx="1"/>
           </p:cNvCxnSpPr>
@@ -3532,8 +3966,8 @@
         </p:nvCxnSpPr>
         <p:spPr>
           <a:xfrm>
-            <a:off x="2960077" y="2637692"/>
-            <a:ext cx="1937238" cy="0"/>
+            <a:off x="2389683" y="2412201"/>
+            <a:ext cx="1158443" cy="2143"/>
           </a:xfrm>
           <a:prstGeom prst="straightConnector1">
             <a:avLst/>
@@ -3566,13 +4000,17 @@
               </a:ext>
             </a:extLst>
           </p:cNvPr>
-          <p:cNvCxnSpPr/>
+          <p:cNvCxnSpPr>
+            <a:cxnSpLocks/>
+            <a:stCxn id="2" idx="3"/>
+            <a:endCxn id="12" idx="1"/>
+          </p:cNvCxnSpPr>
           <p:nvPr/>
         </p:nvCxnSpPr>
         <p:spPr>
           <a:xfrm>
-            <a:off x="7294684" y="2637692"/>
-            <a:ext cx="1937238" cy="0"/>
+            <a:off x="8916638" y="2402889"/>
+            <a:ext cx="838414" cy="0"/>
           </a:xfrm>
           <a:prstGeom prst="straightConnector1">
             <a:avLst/>
@@ -3611,9 +4049,9 @@
           <p:nvPr/>
         </p:nvCxnSpPr>
         <p:spPr>
-          <a:xfrm flipH="1">
-            <a:off x="5797062" y="3083169"/>
-            <a:ext cx="1" cy="685800"/>
+          <a:xfrm>
+            <a:off x="4209535" y="2815615"/>
+            <a:ext cx="0" cy="756862"/>
           </a:xfrm>
           <a:prstGeom prst="line">
             <a:avLst/>
@@ -3653,8 +4091,8 @@
         </p:nvCxnSpPr>
         <p:spPr>
           <a:xfrm flipH="1">
-            <a:off x="10427677" y="3083169"/>
-            <a:ext cx="1" cy="685800"/>
+            <a:off x="7856190" y="2734514"/>
+            <a:ext cx="1" cy="832403"/>
           </a:xfrm>
           <a:prstGeom prst="line">
             <a:avLst/>
@@ -3695,8 +4133,8 @@
         </p:nvCxnSpPr>
         <p:spPr>
           <a:xfrm flipV="1">
-            <a:off x="1761393" y="3083169"/>
-            <a:ext cx="0" cy="685800"/>
+            <a:off x="1304180" y="2815615"/>
+            <a:ext cx="0" cy="756862"/>
           </a:xfrm>
           <a:prstGeom prst="straightConnector1">
             <a:avLst/>
@@ -3737,8 +4175,8 @@
         </p:nvCxnSpPr>
         <p:spPr>
           <a:xfrm flipV="1">
-            <a:off x="6386147" y="3083169"/>
-            <a:ext cx="0" cy="685800"/>
+            <a:off x="4910715" y="2796992"/>
+            <a:ext cx="0" cy="775485"/>
           </a:xfrm>
           <a:prstGeom prst="straightConnector1">
             <a:avLst/>
@@ -3779,8 +4217,8 @@
         </p:nvCxnSpPr>
         <p:spPr>
           <a:xfrm>
-            <a:off x="1764322" y="3768969"/>
-            <a:ext cx="4032740" cy="0"/>
+            <a:off x="1304180" y="3585540"/>
+            <a:ext cx="2905354" cy="0"/>
           </a:xfrm>
           <a:prstGeom prst="line">
             <a:avLst/>
@@ -3820,8 +4258,8 @@
         </p:nvCxnSpPr>
         <p:spPr>
           <a:xfrm>
-            <a:off x="6386147" y="3768969"/>
-            <a:ext cx="4032740" cy="0"/>
+            <a:off x="4910715" y="3572477"/>
+            <a:ext cx="2945475" cy="0"/>
           </a:xfrm>
           <a:prstGeom prst="line">
             <a:avLst/>
@@ -3859,8 +4297,8 @@
         </p:nvSpPr>
         <p:spPr>
           <a:xfrm>
-            <a:off x="3245784" y="2360693"/>
-            <a:ext cx="1365823" cy="276999"/>
+            <a:off x="2436948" y="1954879"/>
+            <a:ext cx="1196161" cy="400110"/>
           </a:xfrm>
           <a:prstGeom prst="rect">
             <a:avLst/>
@@ -3874,10 +4312,18 @@
           <a:lstStyle/>
           <a:p>
             <a:r>
-              <a:rPr lang="en-US" sz="1200" dirty="0">
+              <a:rPr lang="en-US" sz="1000" dirty="0">
                 <a:latin typeface="Rockwell Nova" panose="020F0502020204030204" pitchFamily="18" charset="0"/>
               </a:rPr>
               <a:t>DATA BINDING</a:t>
+            </a:r>
+          </a:p>
+          <a:p>
+            <a:r>
+              <a:rPr lang="en-US" sz="1000" dirty="0">
+                <a:latin typeface="Rockwell Nova" panose="020F0502020204030204" pitchFamily="18" charset="0"/>
+              </a:rPr>
+              <a:t>/COMMANDS</a:t>
             </a:r>
           </a:p>
         </p:txBody>
@@ -3896,8 +4342,8 @@
         </p:nvSpPr>
         <p:spPr>
           <a:xfrm>
-            <a:off x="7851873" y="2360692"/>
-            <a:ext cx="823495" cy="276999"/>
+            <a:off x="5829466" y="1965863"/>
+            <a:ext cx="792205" cy="400110"/>
           </a:xfrm>
           <a:prstGeom prst="rect">
             <a:avLst/>
@@ -3911,7 +4357,15 @@
           <a:lstStyle/>
           <a:p>
             <a:r>
-              <a:rPr lang="en-US" sz="1200" dirty="0">
+              <a:rPr lang="en-US" sz="1000" dirty="0">
+                <a:latin typeface="Rockwell Nova" panose="020F0502020204030204" pitchFamily="18" charset="0"/>
+              </a:rPr>
+              <a:t>QUERY / </a:t>
+            </a:r>
+          </a:p>
+          <a:p>
+            <a:r>
+              <a:rPr lang="en-US" sz="1000" dirty="0">
                 <a:latin typeface="Rockwell Nova" panose="020F0502020204030204" pitchFamily="18" charset="0"/>
               </a:rPr>
               <a:t>UPDATE</a:t>
@@ -3933,7 +4387,7 @@
         </p:nvSpPr>
         <p:spPr>
           <a:xfrm>
-            <a:off x="3052353" y="3823027"/>
+            <a:off x="1838939" y="3666392"/>
             <a:ext cx="1951945" cy="276999"/>
           </a:xfrm>
           <a:prstGeom prst="rect">
@@ -3970,7 +4424,7 @@
         </p:nvSpPr>
         <p:spPr>
           <a:xfrm>
-            <a:off x="7426544" y="3907264"/>
+            <a:off x="5516263" y="3678126"/>
             <a:ext cx="1951945" cy="276999"/>
           </a:xfrm>
           <a:prstGeom prst="rect">
@@ -4007,8 +4461,8 @@
         </p:nvSpPr>
         <p:spPr>
           <a:xfrm>
-            <a:off x="656636" y="1404490"/>
-            <a:ext cx="2614818" cy="400110"/>
+            <a:off x="218677" y="1027584"/>
+            <a:ext cx="2614818" cy="553998"/>
           </a:xfrm>
           <a:prstGeom prst="rect">
             <a:avLst/>
@@ -4022,6 +4476,20 @@
           <a:lstStyle/>
           <a:p>
             <a:r>
+              <a:rPr lang="en-US" sz="1000" b="1" dirty="0">
+                <a:solidFill>
+                  <a:schemeClr val="tx1">
+                    <a:lumMod val="50000"/>
+                    <a:lumOff val="50000"/>
+                  </a:schemeClr>
+                </a:solidFill>
+                <a:latin typeface="Rockwell Nova" panose="020F0502020204030204" pitchFamily="18" charset="0"/>
+              </a:rPr>
+              <a:t>View</a:t>
+            </a:r>
+          </a:p>
+          <a:p>
+            <a:r>
               <a:rPr lang="en-US" sz="1000" dirty="0">
                 <a:solidFill>
                   <a:schemeClr val="bg1">
@@ -4062,8 +4530,8 @@
         </p:nvSpPr>
         <p:spPr>
           <a:xfrm>
-            <a:off x="4897315" y="1404490"/>
-            <a:ext cx="2747868" cy="707886"/>
+            <a:off x="3566710" y="968363"/>
+            <a:ext cx="2747868" cy="861774"/>
           </a:xfrm>
           <a:prstGeom prst="rect">
             <a:avLst/>
@@ -4077,6 +4545,29 @@
           <a:lstStyle/>
           <a:p>
             <a:r>
+              <a:rPr lang="en-US" sz="1000" b="1" dirty="0" err="1">
+                <a:solidFill>
+                  <a:schemeClr val="tx1">
+                    <a:lumMod val="50000"/>
+                    <a:lumOff val="50000"/>
+                  </a:schemeClr>
+                </a:solidFill>
+                <a:latin typeface="Rockwell Nova" panose="020F0502020204030204" pitchFamily="18" charset="0"/>
+              </a:rPr>
+              <a:t>ViewModel</a:t>
+            </a:r>
+            <a:endParaRPr lang="en-US" sz="1000" b="1" dirty="0">
+              <a:solidFill>
+                <a:schemeClr val="tx1">
+                  <a:lumMod val="50000"/>
+                  <a:lumOff val="50000"/>
+                </a:schemeClr>
+              </a:solidFill>
+              <a:latin typeface="Rockwell Nova" panose="020F0502020204030204" pitchFamily="18" charset="0"/>
+            </a:endParaRPr>
+          </a:p>
+          <a:p>
+            <a:r>
               <a:rPr lang="en-US" sz="1000" dirty="0">
                 <a:solidFill>
                   <a:schemeClr val="bg1">
@@ -4143,8 +4634,8 @@
         </p:nvSpPr>
         <p:spPr>
           <a:xfrm>
-            <a:off x="9137994" y="1404490"/>
-            <a:ext cx="1963999" cy="553998"/>
+            <a:off x="8442687" y="945534"/>
+            <a:ext cx="1963999" cy="707886"/>
           </a:xfrm>
           <a:prstGeom prst="rect">
             <a:avLst/>
@@ -4158,6 +4649,20 @@
           <a:lstStyle/>
           <a:p>
             <a:r>
+              <a:rPr lang="en-US" sz="1000" b="1" dirty="0">
+                <a:solidFill>
+                  <a:schemeClr val="tx1">
+                    <a:lumMod val="50000"/>
+                    <a:lumOff val="50000"/>
+                  </a:schemeClr>
+                </a:solidFill>
+                <a:latin typeface="Rockwell Nova" panose="020F0502020204030204" pitchFamily="18" charset="0"/>
+              </a:rPr>
+              <a:t>Model</a:t>
+            </a:r>
+          </a:p>
+          <a:p>
+            <a:r>
               <a:rPr lang="en-US" sz="1000" dirty="0">
                 <a:solidFill>
                   <a:schemeClr val="bg1">
@@ -4211,7 +4716,7 @@
         </p:nvSpPr>
         <p:spPr>
           <a:xfrm>
-            <a:off x="1189527" y="6112292"/>
+            <a:off x="845495" y="5928863"/>
             <a:ext cx="1808508" cy="553998"/>
           </a:xfrm>
           <a:prstGeom prst="rect">
@@ -4278,7 +4783,7 @@
         </p:nvCxnSpPr>
         <p:spPr>
           <a:xfrm>
-            <a:off x="499337" y="6239465"/>
+            <a:off x="155305" y="6056036"/>
             <a:ext cx="632346" cy="0"/>
           </a:xfrm>
           <a:prstGeom prst="straightConnector1">
@@ -4319,7 +4824,7 @@
         </p:nvCxnSpPr>
         <p:spPr>
           <a:xfrm>
-            <a:off x="499337" y="6541417"/>
+            <a:off x="155305" y="6357988"/>
             <a:ext cx="632346" cy="0"/>
           </a:xfrm>
           <a:prstGeom prst="straightConnector1">
@@ -4345,6 +4850,259 @@
           </a:fontRef>
         </p:style>
       </p:cxnSp>
+      <p:sp>
+        <p:nvSpPr>
+          <p:cNvPr id="2" name="Rektangel: afrundede hjørner 1">
+            <a:extLst>
+              <a:ext uri="{FF2B5EF4-FFF2-40B4-BE49-F238E27FC236}">
+                <a16:creationId xmlns:a16="http://schemas.microsoft.com/office/drawing/2014/main" id="{6F8C42D4-7245-39E0-0567-9DD4F0081DA3}"/>
+              </a:ext>
+            </a:extLst>
+          </p:cNvPr>
+          <p:cNvSpPr/>
+          <p:nvPr/>
+        </p:nvSpPr>
+        <p:spPr>
+          <a:xfrm>
+            <a:off x="6795742" y="2008786"/>
+            <a:ext cx="2120896" cy="788206"/>
+          </a:xfrm>
+          <a:prstGeom prst="roundRect">
+            <a:avLst/>
+          </a:prstGeom>
+        </p:spPr>
+        <p:style>
+          <a:lnRef idx="3">
+            <a:schemeClr val="lt1"/>
+          </a:lnRef>
+          <a:fillRef idx="1">
+            <a:schemeClr val="accent4"/>
+          </a:fillRef>
+          <a:effectRef idx="1">
+            <a:schemeClr val="accent4"/>
+          </a:effectRef>
+          <a:fontRef idx="minor">
+            <a:schemeClr val="lt1"/>
+          </a:fontRef>
+        </p:style>
+        <p:txBody>
+          <a:bodyPr rtlCol="0" anchor="ctr"/>
+          <a:lstStyle/>
+          <a:p>
+            <a:pPr algn="ctr"/>
+            <a:r>
+              <a:rPr lang="en-US" dirty="0">
+                <a:latin typeface="Rockwell Extra Bold" panose="02060903040505020403" pitchFamily="18" charset="0"/>
+              </a:rPr>
+              <a:t>Repository</a:t>
+            </a:r>
+          </a:p>
+        </p:txBody>
+      </p:sp>
+      <p:cxnSp>
+        <p:nvCxnSpPr>
+          <p:cNvPr id="3" name="Lige pilforbindelse 2">
+            <a:extLst>
+              <a:ext uri="{FF2B5EF4-FFF2-40B4-BE49-F238E27FC236}">
+                <a16:creationId xmlns:a16="http://schemas.microsoft.com/office/drawing/2014/main" id="{16EC872C-325F-7829-DCC2-2005DE331A79}"/>
+              </a:ext>
+            </a:extLst>
+          </p:cNvPr>
+          <p:cNvCxnSpPr>
+            <a:cxnSpLocks/>
+            <a:stCxn id="11" idx="3"/>
+            <a:endCxn id="2" idx="1"/>
+          </p:cNvCxnSpPr>
+          <p:nvPr/>
+        </p:nvCxnSpPr>
+        <p:spPr>
+          <a:xfrm flipV="1">
+            <a:off x="5637299" y="2402889"/>
+            <a:ext cx="1158443" cy="11455"/>
+          </a:xfrm>
+          <a:prstGeom prst="straightConnector1">
+            <a:avLst/>
+          </a:prstGeom>
+          <a:ln>
+            <a:tailEnd type="triangle"/>
+          </a:ln>
+        </p:spPr>
+        <p:style>
+          <a:lnRef idx="2">
+            <a:schemeClr val="accent1"/>
+          </a:lnRef>
+          <a:fillRef idx="0">
+            <a:schemeClr val="accent1"/>
+          </a:fillRef>
+          <a:effectRef idx="1">
+            <a:schemeClr val="accent1"/>
+          </a:effectRef>
+          <a:fontRef idx="minor">
+            <a:schemeClr val="tx1"/>
+          </a:fontRef>
+        </p:style>
+      </p:cxnSp>
+      <p:cxnSp>
+        <p:nvCxnSpPr>
+          <p:cNvPr id="64" name="Lige forbindelse 63">
+            <a:extLst>
+              <a:ext uri="{FF2B5EF4-FFF2-40B4-BE49-F238E27FC236}">
+                <a16:creationId xmlns:a16="http://schemas.microsoft.com/office/drawing/2014/main" id="{8783670B-AED7-6B46-148C-F08DB802E69F}"/>
+              </a:ext>
+            </a:extLst>
+          </p:cNvPr>
+          <p:cNvCxnSpPr>
+            <a:cxnSpLocks/>
+          </p:cNvCxnSpPr>
+          <p:nvPr/>
+        </p:nvCxnSpPr>
+        <p:spPr>
+          <a:xfrm flipH="1">
+            <a:off x="10815500" y="2772251"/>
+            <a:ext cx="1" cy="775485"/>
+          </a:xfrm>
+          <a:prstGeom prst="line">
+            <a:avLst/>
+          </a:prstGeom>
+          <a:ln>
+            <a:prstDash val="sysDash"/>
+          </a:ln>
+        </p:spPr>
+        <p:style>
+          <a:lnRef idx="2">
+            <a:schemeClr val="accent1"/>
+          </a:lnRef>
+          <a:fillRef idx="0">
+            <a:schemeClr val="accent1"/>
+          </a:fillRef>
+          <a:effectRef idx="1">
+            <a:schemeClr val="accent1"/>
+          </a:effectRef>
+          <a:fontRef idx="minor">
+            <a:schemeClr val="tx1"/>
+          </a:fontRef>
+        </p:style>
+      </p:cxnSp>
+      <p:cxnSp>
+        <p:nvCxnSpPr>
+          <p:cNvPr id="65" name="Lige pilforbindelse 64">
+            <a:extLst>
+              <a:ext uri="{FF2B5EF4-FFF2-40B4-BE49-F238E27FC236}">
+                <a16:creationId xmlns:a16="http://schemas.microsoft.com/office/drawing/2014/main" id="{8E648869-EB27-05C5-397F-92B46CFCC1FF}"/>
+              </a:ext>
+            </a:extLst>
+          </p:cNvPr>
+          <p:cNvCxnSpPr>
+            <a:cxnSpLocks/>
+          </p:cNvCxnSpPr>
+          <p:nvPr/>
+        </p:nvCxnSpPr>
+        <p:spPr>
+          <a:xfrm flipV="1">
+            <a:off x="8299819" y="2772251"/>
+            <a:ext cx="0" cy="775485"/>
+          </a:xfrm>
+          <a:prstGeom prst="straightConnector1">
+            <a:avLst/>
+          </a:prstGeom>
+          <a:ln>
+            <a:prstDash val="sysDash"/>
+            <a:tailEnd type="triangle"/>
+          </a:ln>
+        </p:spPr>
+        <p:style>
+          <a:lnRef idx="2">
+            <a:schemeClr val="accent1"/>
+          </a:lnRef>
+          <a:fillRef idx="0">
+            <a:schemeClr val="accent1"/>
+          </a:fillRef>
+          <a:effectRef idx="1">
+            <a:schemeClr val="accent1"/>
+          </a:effectRef>
+          <a:fontRef idx="minor">
+            <a:schemeClr val="tx1"/>
+          </a:fontRef>
+        </p:style>
+      </p:cxnSp>
+      <p:cxnSp>
+        <p:nvCxnSpPr>
+          <p:cNvPr id="66" name="Lige forbindelse 65">
+            <a:extLst>
+              <a:ext uri="{FF2B5EF4-FFF2-40B4-BE49-F238E27FC236}">
+                <a16:creationId xmlns:a16="http://schemas.microsoft.com/office/drawing/2014/main" id="{A451BB09-277E-DAC0-7425-B724355718F2}"/>
+              </a:ext>
+            </a:extLst>
+          </p:cNvPr>
+          <p:cNvCxnSpPr>
+            <a:cxnSpLocks/>
+          </p:cNvCxnSpPr>
+          <p:nvPr/>
+        </p:nvCxnSpPr>
+        <p:spPr>
+          <a:xfrm>
+            <a:off x="8299819" y="3547736"/>
+            <a:ext cx="2515681" cy="0"/>
+          </a:xfrm>
+          <a:prstGeom prst="line">
+            <a:avLst/>
+          </a:prstGeom>
+          <a:ln>
+            <a:prstDash val="sysDash"/>
+          </a:ln>
+        </p:spPr>
+        <p:style>
+          <a:lnRef idx="2">
+            <a:schemeClr val="accent1"/>
+          </a:lnRef>
+          <a:fillRef idx="0">
+            <a:schemeClr val="accent1"/>
+          </a:fillRef>
+          <a:effectRef idx="1">
+            <a:schemeClr val="accent1"/>
+          </a:effectRef>
+          <a:fontRef idx="minor">
+            <a:schemeClr val="tx1"/>
+          </a:fontRef>
+        </p:style>
+      </p:cxnSp>
+      <p:sp>
+        <p:nvSpPr>
+          <p:cNvPr id="67" name="Tekstfelt 66">
+            <a:extLst>
+              <a:ext uri="{FF2B5EF4-FFF2-40B4-BE49-F238E27FC236}">
+                <a16:creationId xmlns:a16="http://schemas.microsoft.com/office/drawing/2014/main" id="{08ACA3A3-1ADC-8741-829F-51D3B2F1C76B}"/>
+              </a:ext>
+            </a:extLst>
+          </p:cNvPr>
+          <p:cNvSpPr txBox="1"/>
+          <p:nvPr/>
+        </p:nvSpPr>
+        <p:spPr>
+          <a:xfrm>
+            <a:off x="8581686" y="3662715"/>
+            <a:ext cx="1951945" cy="276999"/>
+          </a:xfrm>
+          <a:prstGeom prst="rect">
+            <a:avLst/>
+          </a:prstGeom>
+          <a:noFill/>
+        </p:spPr>
+        <p:txBody>
+          <a:bodyPr wrap="none" rtlCol="0">
+            <a:spAutoFit/>
+          </a:bodyPr>
+          <a:lstStyle/>
+          <a:p>
+            <a:r>
+              <a:rPr lang="en-US" sz="1200" dirty="0">
+                <a:latin typeface="Rockwell Nova" panose="020F0502020204030204" pitchFamily="18" charset="0"/>
+              </a:rPr>
+              <a:t>SEND NOTIFICATIONS</a:t>
+            </a:r>
+          </a:p>
+        </p:txBody>
+      </p:sp>
     </p:spTree>
     <p:extLst>
       <p:ext uri="{BB962C8B-B14F-4D97-AF65-F5344CB8AC3E}">

</xml_diff>